<commit_message>
update leetcode 46 animation.
</commit_message>
<xml_diff>
--- a/0001-0100/LeetCode 第 46 题：“全排列”题解配图.pptx
+++ b/0001-0100/LeetCode 第 46 题：“全排列”题解配图.pptx
@@ -346,7 +346,7 @@
           <a:p>
             <a:fld id="{7C955CD6-C544-6447-88CB-A2D8D4C328B3}" type="datetimeFigureOut">
               <a:rPr kumimoji="1" lang="zh-CN" altLang="en-US" smtClean="0"/>
-              <a:t>2019/6/29</a:t>
+              <a:t>2019/7/25</a:t>
             </a:fld>
             <a:endParaRPr kumimoji="1" lang="zh-CN" altLang="en-US"/>
           </a:p>
@@ -852,7 +852,7 @@
         <p:spPr>
           <a:xfrm flipH="1">
             <a:off x="380474" y="789563"/>
-            <a:ext cx="9649646" cy="461665"/>
+            <a:ext cx="5361958" cy="400110"/>
           </a:xfrm>
           <a:prstGeom prst="rect">
             <a:avLst/>
@@ -882,7 +882,7 @@
               <a:buChar char="Ø"/>
             </a:pPr>
             <a:r>
-              <a:rPr kumimoji="1" lang="zh-CN" altLang="en-US" sz="2400" b="1" dirty="0">
+              <a:rPr kumimoji="1" lang="zh-CN" altLang="en-US" sz="2000" b="1" dirty="0">
                 <a:solidFill>
                   <a:schemeClr val="bg1"/>
                 </a:solidFill>
@@ -890,7 +890,177 @@
                 <a:ea typeface="KaiTi_GB2312" panose="02010609030101010101" pitchFamily="49" charset="-122"/>
                 <a:cs typeface="Times New Roman" panose="02020603050405020304" pitchFamily="18" charset="0"/>
               </a:rPr>
-              <a:t>从这张图中体会为什么要使用一个布尔数组记录哪个元素使用过。</a:t>
+              <a:t>思想：回溯（深度优先遍历 </a:t>
+            </a:r>
+            <a:r>
+              <a:rPr kumimoji="1" lang="en-US" altLang="zh-CN" sz="2000" b="1" dirty="0">
+                <a:solidFill>
+                  <a:schemeClr val="bg1"/>
+                </a:solidFill>
+                <a:latin typeface="Times New Roman" panose="02020603050405020304" pitchFamily="18" charset="0"/>
+                <a:ea typeface="KaiTi_GB2312" panose="02010609030101010101" pitchFamily="49" charset="-122"/>
+                <a:cs typeface="Times New Roman" panose="02020603050405020304" pitchFamily="18" charset="0"/>
+              </a:rPr>
+              <a:t>+</a:t>
+            </a:r>
+            <a:r>
+              <a:rPr kumimoji="1" lang="zh-CN" altLang="en-US" sz="2000" b="1" dirty="0">
+                <a:solidFill>
+                  <a:schemeClr val="bg1"/>
+                </a:solidFill>
+                <a:latin typeface="Times New Roman" panose="02020603050405020304" pitchFamily="18" charset="0"/>
+                <a:ea typeface="KaiTi_GB2312" panose="02010609030101010101" pitchFamily="49" charset="-122"/>
+                <a:cs typeface="Times New Roman" panose="02020603050405020304" pitchFamily="18" charset="0"/>
+              </a:rPr>
+              <a:t> 状态重置）。</a:t>
+            </a:r>
+          </a:p>
+        </p:txBody>
+      </p:sp>
+      <p:sp>
+        <p:nvSpPr>
+          <p:cNvPr id="6" name="矩形 5">
+            <a:extLst>
+              <a:ext uri="{FF2B5EF4-FFF2-40B4-BE49-F238E27FC236}">
+                <a16:creationId xmlns:a16="http://schemas.microsoft.com/office/drawing/2014/main" id="{35604338-D204-C441-9E75-126277576E8C}"/>
+              </a:ext>
+            </a:extLst>
+          </p:cNvPr>
+          <p:cNvSpPr/>
+          <p:nvPr/>
+        </p:nvSpPr>
+        <p:spPr>
+          <a:xfrm>
+            <a:off x="316466" y="1273429"/>
+            <a:ext cx="10583182" cy="1077218"/>
+          </a:xfrm>
+          <a:prstGeom prst="rect">
+            <a:avLst/>
+          </a:prstGeom>
+          <a:solidFill>
+            <a:srgbClr val="FFFF00"/>
+          </a:solidFill>
+          <a:effectLst>
+            <a:softEdge rad="31750"/>
+          </a:effectLst>
+        </p:spPr>
+        <p:txBody>
+          <a:bodyPr wrap="square">
+            <a:spAutoFit/>
+          </a:bodyPr>
+          <a:lstStyle/>
+          <a:p>
+            <a:pPr marL="285750" indent="-285750">
+              <a:buFont typeface="Wingdings" pitchFamily="2" charset="2"/>
+              <a:buChar char="Ø"/>
+            </a:pPr>
+            <a:r>
+              <a:rPr lang="zh-CN" altLang="en-US" sz="1600" dirty="0">
+                <a:latin typeface="Times New Roman" panose="02020603050405020304" pitchFamily="18" charset="0"/>
+                <a:ea typeface="KaiTi" panose="02010609060101010101" pitchFamily="49" charset="-122"/>
+                <a:cs typeface="Times New Roman" panose="02020603050405020304" pitchFamily="18" charset="0"/>
+              </a:rPr>
+              <a:t>从叶子结点到根节点形成的一条路径，就是题目要求的一个排列；</a:t>
+            </a:r>
+            <a:endParaRPr lang="en-US" altLang="zh-CN" sz="1600" dirty="0">
+              <a:latin typeface="Times New Roman" panose="02020603050405020304" pitchFamily="18" charset="0"/>
+              <a:ea typeface="KaiTi" panose="02010609060101010101" pitchFamily="49" charset="-122"/>
+              <a:cs typeface="Times New Roman" panose="02020603050405020304" pitchFamily="18" charset="0"/>
+            </a:endParaRPr>
+          </a:p>
+          <a:p>
+            <a:pPr marL="285750" indent="-285750">
+              <a:buFont typeface="Wingdings" pitchFamily="2" charset="2"/>
+              <a:buChar char="Ø"/>
+            </a:pPr>
+            <a:r>
+              <a:rPr lang="zh-CN" altLang="en-US" sz="1600" b="1" dirty="0">
+                <a:solidFill>
+                  <a:srgbClr val="FF0000"/>
+                </a:solidFill>
+                <a:latin typeface="Times New Roman" panose="02020603050405020304" pitchFamily="18" charset="0"/>
+                <a:ea typeface="KaiTi" panose="02010609060101010101" pitchFamily="49" charset="-122"/>
+                <a:cs typeface="Times New Roman" panose="02020603050405020304" pitchFamily="18" charset="0"/>
+              </a:rPr>
+              <a:t>在更深层可选的数一定不能包括在之前的层选过的数</a:t>
+            </a:r>
+            <a:r>
+              <a:rPr lang="zh-CN" altLang="en-US" sz="1600" dirty="0">
+                <a:latin typeface="Times New Roman" panose="02020603050405020304" pitchFamily="18" charset="0"/>
+                <a:ea typeface="KaiTi" panose="02010609060101010101" pitchFamily="49" charset="-122"/>
+                <a:cs typeface="Times New Roman" panose="02020603050405020304" pitchFamily="18" charset="0"/>
+              </a:rPr>
+              <a:t>，因此需要使用一个数组 </a:t>
+            </a:r>
+            <a:r>
+              <a:rPr lang="en-US" altLang="zh-CN" sz="1600" dirty="0">
+                <a:latin typeface="Times New Roman" panose="02020603050405020304" pitchFamily="18" charset="0"/>
+                <a:ea typeface="KaiTi" panose="02010609060101010101" pitchFamily="49" charset="-122"/>
+                <a:cs typeface="Times New Roman" panose="02020603050405020304" pitchFamily="18" charset="0"/>
+              </a:rPr>
+              <a:t>used</a:t>
+            </a:r>
+            <a:r>
+              <a:rPr lang="zh-CN" altLang="en-US" sz="1600" dirty="0">
+                <a:latin typeface="Times New Roman" panose="02020603050405020304" pitchFamily="18" charset="0"/>
+                <a:ea typeface="KaiTi" panose="02010609060101010101" pitchFamily="49" charset="-122"/>
+                <a:cs typeface="Times New Roman" panose="02020603050405020304" pitchFamily="18" charset="0"/>
+              </a:rPr>
+              <a:t> 记录哪些数在之前的层选过，</a:t>
+            </a:r>
+            <a:endParaRPr lang="en-US" altLang="zh-CN" sz="1600" dirty="0">
+              <a:latin typeface="Times New Roman" panose="02020603050405020304" pitchFamily="18" charset="0"/>
+              <a:ea typeface="KaiTi" panose="02010609060101010101" pitchFamily="49" charset="-122"/>
+              <a:cs typeface="Times New Roman" panose="02020603050405020304" pitchFamily="18" charset="0"/>
+            </a:endParaRPr>
+          </a:p>
+          <a:p>
+            <a:pPr marL="285750" indent="-285750">
+              <a:buFont typeface="Wingdings" pitchFamily="2" charset="2"/>
+              <a:buChar char="Ø"/>
+            </a:pPr>
+            <a:r>
+              <a:rPr lang="zh-CN" altLang="en-US" sz="1600" dirty="0">
+                <a:latin typeface="Times New Roman" panose="02020603050405020304" pitchFamily="18" charset="0"/>
+                <a:ea typeface="KaiTi" panose="02010609060101010101" pitchFamily="49" charset="-122"/>
+                <a:cs typeface="Times New Roman" panose="02020603050405020304" pitchFamily="18" charset="0"/>
+              </a:rPr>
+              <a:t>在“回溯”的时候，状态要“重置”；</a:t>
+            </a:r>
+            <a:endParaRPr lang="en-US" altLang="zh-CN" sz="1600" dirty="0">
+              <a:latin typeface="Times New Roman" panose="02020603050405020304" pitchFamily="18" charset="0"/>
+              <a:ea typeface="KaiTi" panose="02010609060101010101" pitchFamily="49" charset="-122"/>
+              <a:cs typeface="Times New Roman" panose="02020603050405020304" pitchFamily="18" charset="0"/>
+            </a:endParaRPr>
+          </a:p>
+          <a:p>
+            <a:pPr marL="285750" indent="-285750">
+              <a:buFont typeface="Wingdings" pitchFamily="2" charset="2"/>
+              <a:buChar char="Ø"/>
+            </a:pPr>
+            <a:r>
+              <a:rPr lang="zh-CN" altLang="en-US" sz="1600" dirty="0">
+                <a:latin typeface="Times New Roman" panose="02020603050405020304" pitchFamily="18" charset="0"/>
+                <a:ea typeface="KaiTi" panose="02010609060101010101" pitchFamily="49" charset="-122"/>
+                <a:cs typeface="Times New Roman" panose="02020603050405020304" pitchFamily="18" charset="0"/>
+              </a:rPr>
+              <a:t>数组 </a:t>
+            </a:r>
+            <a:r>
+              <a:rPr lang="en-US" altLang="zh-CN" sz="1600" dirty="0">
+                <a:latin typeface="Times New Roman" panose="02020603050405020304" pitchFamily="18" charset="0"/>
+                <a:ea typeface="KaiTi" panose="02010609060101010101" pitchFamily="49" charset="-122"/>
+                <a:cs typeface="Times New Roman" panose="02020603050405020304" pitchFamily="18" charset="0"/>
+              </a:rPr>
+              <a:t>used</a:t>
+            </a:r>
+            <a:r>
+              <a:rPr lang="zh-CN" altLang="en-US" sz="1600" dirty="0">
+                <a:latin typeface="Times New Roman" panose="02020603050405020304" pitchFamily="18" charset="0"/>
+                <a:ea typeface="KaiTi" panose="02010609060101010101" pitchFamily="49" charset="-122"/>
+                <a:cs typeface="Times New Roman" panose="02020603050405020304" pitchFamily="18" charset="0"/>
+              </a:rPr>
+              <a:t> 还可以使用位掩码代替。 </a:t>
             </a:r>
           </a:p>
         </p:txBody>
@@ -917,7 +1087,7 @@
         </p:blipFill>
         <p:spPr>
           <a:xfrm>
-            <a:off x="161017" y="1627633"/>
+            <a:off x="161017" y="2126308"/>
             <a:ext cx="11849243" cy="4617720"/>
           </a:xfrm>
           <a:prstGeom prst="rect">

</xml_diff>